<commit_message>
Norm added two graphs
</commit_message>
<xml_diff>
--- a/COVID-19-gini.pptx
+++ b/COVID-19-gini.pptx
@@ -13348,7 +13348,7 @@
   <dgm:whole/>
   <dgm:extLst>
     <a:ext uri="http://schemas.microsoft.com/office/drawing/2008/diagram">
-      <dsp:dataModelExt xmlns:dsp="http://schemas.microsoft.com/office/drawing/2008/diagram" relId="rId6" minVer="http://schemas.openxmlformats.org/drawingml/2006/diagram"/>
+      <dsp:dataModelExt xmlns:dsp="http://schemas.microsoft.com/office/drawing/2008/diagram" relId="rId7" minVer="http://schemas.openxmlformats.org/drawingml/2006/diagram"/>
     </a:ext>
   </dgm:extLst>
 </dgm:dataModel>
@@ -13783,7 +13783,7 @@
   <dgm:whole/>
   <dgm:extLst>
     <a:ext uri="http://schemas.microsoft.com/office/drawing/2008/diagram">
-      <dsp:dataModelExt xmlns:dsp="http://schemas.microsoft.com/office/drawing/2008/diagram" relId="rId6" minVer="http://schemas.openxmlformats.org/drawingml/2006/diagram"/>
+      <dsp:dataModelExt xmlns:dsp="http://schemas.microsoft.com/office/drawing/2008/diagram" relId="rId7" minVer="http://schemas.openxmlformats.org/drawingml/2006/diagram"/>
     </a:ext>
   </dgm:extLst>
 </dgm:dataModel>
@@ -38545,7 +38545,7 @@
           <a:p>
             <a:fld id="{9395819E-5913-4994-A6BE-75BC60B0C422}" type="datetimeFigureOut">
               <a:rPr lang="en-US" smtClean="0"/>
-              <a:t>3/18/2020</a:t>
+              <a:t>3/19/2020</a:t>
             </a:fld>
             <a:endParaRPr lang="en-US"/>
           </a:p>
@@ -39038,7 +39038,7 @@
           <a:p>
             <a:fld id="{48A87A34-81AB-432B-8DAE-1953F412C126}" type="datetimeFigureOut">
               <a:rPr lang="en-US" smtClean="0"/>
-              <a:t>3/18/2020</a:t>
+              <a:t>3/19/2020</a:t>
             </a:fld>
             <a:endParaRPr lang="en-US" dirty="0"/>
           </a:p>
@@ -39251,7 +39251,7 @@
           <a:p>
             <a:fld id="{48A87A34-81AB-432B-8DAE-1953F412C126}" type="datetimeFigureOut">
               <a:rPr lang="en-US" smtClean="0"/>
-              <a:t>3/18/2020</a:t>
+              <a:t>3/19/2020</a:t>
             </a:fld>
             <a:endParaRPr lang="en-US" dirty="0"/>
           </a:p>
@@ -39508,7 +39508,7 @@
             <a:fld id="{48A87A34-81AB-432B-8DAE-1953F412C126}" type="datetimeFigureOut">
               <a:rPr lang="en-US" smtClean="0"/>
               <a:pPr/>
-              <a:t>3/18/2020</a:t>
+              <a:t>3/19/2020</a:t>
             </a:fld>
             <a:endParaRPr lang="en-US" dirty="0"/>
           </a:p>
@@ -39687,7 +39687,7 @@
           <a:p>
             <a:fld id="{48A87A34-81AB-432B-8DAE-1953F412C126}" type="datetimeFigureOut">
               <a:rPr lang="en-US" smtClean="0"/>
-              <a:t>3/18/2020</a:t>
+              <a:t>3/19/2020</a:t>
             </a:fld>
             <a:endParaRPr lang="en-US" dirty="0"/>
           </a:p>
@@ -40031,7 +40031,7 @@
             <a:fld id="{48A87A34-81AB-432B-8DAE-1953F412C126}" type="datetimeFigureOut">
               <a:rPr lang="en-US" smtClean="0"/>
               <a:pPr/>
-              <a:t>3/18/2020</a:t>
+              <a:t>3/19/2020</a:t>
             </a:fld>
             <a:endParaRPr lang="en-US" dirty="0"/>
           </a:p>
@@ -40311,7 +40311,7 @@
           <a:p>
             <a:fld id="{48A87A34-81AB-432B-8DAE-1953F412C126}" type="datetimeFigureOut">
               <a:rPr lang="en-US" smtClean="0"/>
-              <a:t>3/18/2020</a:t>
+              <a:t>3/19/2020</a:t>
             </a:fld>
             <a:endParaRPr lang="en-US" dirty="0"/>
           </a:p>
@@ -40690,7 +40690,7 @@
           <a:p>
             <a:fld id="{48A87A34-81AB-432B-8DAE-1953F412C126}" type="datetimeFigureOut">
               <a:rPr lang="en-US" smtClean="0"/>
-              <a:t>3/18/2020</a:t>
+              <a:t>3/19/2020</a:t>
             </a:fld>
             <a:endParaRPr lang="en-US" dirty="0"/>
           </a:p>
@@ -40808,7 +40808,7 @@
           <a:p>
             <a:fld id="{48A87A34-81AB-432B-8DAE-1953F412C126}" type="datetimeFigureOut">
               <a:rPr lang="en-US" smtClean="0"/>
-              <a:t>3/18/2020</a:t>
+              <a:t>3/19/2020</a:t>
             </a:fld>
             <a:endParaRPr lang="en-US" dirty="0"/>
           </a:p>
@@ -40979,7 +40979,7 @@
           <a:p>
             <a:fld id="{48A87A34-81AB-432B-8DAE-1953F412C126}" type="datetimeFigureOut">
               <a:rPr lang="en-US" smtClean="0"/>
-              <a:t>3/18/2020</a:t>
+              <a:t>3/19/2020</a:t>
             </a:fld>
             <a:endParaRPr lang="en-US" dirty="0"/>
           </a:p>
@@ -41333,7 +41333,7 @@
           <a:p>
             <a:fld id="{48A87A34-81AB-432B-8DAE-1953F412C126}" type="datetimeFigureOut">
               <a:rPr lang="en-US" smtClean="0"/>
-              <a:t>3/18/2020</a:t>
+              <a:t>3/19/2020</a:t>
             </a:fld>
             <a:endParaRPr lang="en-US" dirty="0"/>
           </a:p>
@@ -41715,7 +41715,7 @@
           <a:p>
             <a:fld id="{48A87A34-81AB-432B-8DAE-1953F412C126}" type="datetimeFigureOut">
               <a:rPr lang="en-US" smtClean="0"/>
-              <a:t>3/18/2020</a:t>
+              <a:t>3/19/2020</a:t>
             </a:fld>
             <a:endParaRPr lang="en-US" dirty="0"/>
           </a:p>
@@ -42003,7 +42003,7 @@
             <a:fld id="{48A87A34-81AB-432B-8DAE-1953F412C126}" type="datetimeFigureOut">
               <a:rPr lang="en-US" smtClean="0"/>
               <a:pPr/>
-              <a:t>3/18/2020</a:t>
+              <a:t>3/19/2020</a:t>
             </a:fld>
             <a:endParaRPr lang="en-US" dirty="0"/>
           </a:p>
@@ -42557,12 +42557,8 @@
           <a:p>
             <a:pPr algn="ctr"/>
             <a:r>
-              <a:rPr lang="en-US" sz="4400" dirty="0" err="1"/>
-              <a:t>Covid</a:t>
-            </a:r>
-            <a:r>
               <a:rPr lang="en-US" sz="4400" dirty="0"/>
-              <a:t> – 19</a:t>
+              <a:t>COVID-19</a:t>
             </a:r>
           </a:p>
         </p:txBody>
@@ -42795,7 +42791,15 @@
           <a:p>
             <a:r>
               <a:rPr lang="en-US" sz="2400" dirty="0"/>
-              <a:t>Norman Gwinn | </a:t>
+              <a:t>Gini </a:t>
+            </a:r>
+            <a:r>
+              <a:rPr lang="en-US" sz="2400" dirty="0" err="1"/>
+              <a:t>Arimbi</a:t>
+            </a:r>
+            <a:r>
+              <a:rPr lang="en-US" sz="2400" dirty="0"/>
+              <a:t> | </a:t>
             </a:r>
             <a:r>
               <a:rPr lang="en-US" sz="2400" dirty="0" err="1"/>
@@ -42803,7 +42807,7 @@
             </a:r>
             <a:r>
               <a:rPr lang="en-US" sz="2400" dirty="0"/>
-              <a:t> Duke | Michael </a:t>
+              <a:t> Duke | Norman Gwinn| Michael </a:t>
             </a:r>
             <a:r>
               <a:rPr lang="en-US" sz="2400" dirty="0" err="1"/>
@@ -42811,7 +42815,7 @@
             </a:r>
             <a:r>
               <a:rPr lang="en-US" sz="2400" dirty="0"/>
-              <a:t> | Gini Arimbi</a:t>
+              <a:t> </a:t>
             </a:r>
           </a:p>
         </p:txBody>
@@ -44746,7 +44750,7 @@
           <a:p>
             <a:r>
               <a:rPr lang="en-US" sz="2400" dirty="0"/>
-              <a:t>Different health care facility</a:t>
+              <a:t>Different health care capabilities</a:t>
             </a:r>
           </a:p>
           <a:p>
@@ -44755,7 +44759,7 @@
           <a:p>
             <a:r>
               <a:rPr lang="en-US" sz="2400" dirty="0"/>
-              <a:t>To check the health care preparedness for US states</a:t>
+              <a:t>Preparedness for US states</a:t>
             </a:r>
           </a:p>
         </p:txBody>
@@ -45251,36 +45255,35 @@
           </a:p>
         </p:txBody>
       </p:sp>
-      <p:sp>
-        <p:nvSpPr>
-          <p:cNvPr id="3" name="Content Placeholder 2">
+      <p:pic>
+        <p:nvPicPr>
+          <p:cNvPr id="6" name="Content Placeholder 5" descr="A close up of a map&#10;&#10;Description automatically generated">
             <a:extLst>
               <a:ext uri="{FF2B5EF4-FFF2-40B4-BE49-F238E27FC236}">
-                <a16:creationId xmlns:a16="http://schemas.microsoft.com/office/drawing/2014/main" id="{2C027839-FBED-4373-9E00-67E0FB6AB1B4}"/>
+                <a16:creationId xmlns:a16="http://schemas.microsoft.com/office/drawing/2014/main" id="{2B903A7F-2A0F-44D5-8EDC-E8E1947104D6}"/>
               </a:ext>
             </a:extLst>
           </p:cNvPr>
-          <p:cNvSpPr>
-            <a:spLocks noGrp="1"/>
-          </p:cNvSpPr>
+          <p:cNvPicPr>
+            <a:picLocks noGrp="1" noChangeAspect="1"/>
+          </p:cNvPicPr>
           <p:nvPr>
             <p:ph idx="1"/>
           </p:nvPr>
-        </p:nvSpPr>
+        </p:nvPicPr>
+        <p:blipFill>
+          <a:blip r:embed="rId2"/>
+          <a:stretch>
+            <a:fillRect/>
+          </a:stretch>
+        </p:blipFill>
         <p:spPr>
           <a:xfrm>
-            <a:off x="685800" y="1942499"/>
-            <a:ext cx="10820400" cy="4024125"/>
+            <a:off x="3010260" y="1920518"/>
+            <a:ext cx="6707188" cy="4024313"/>
           </a:xfrm>
         </p:spPr>
-        <p:txBody>
-          <a:bodyPr/>
-          <a:lstStyle/>
-          <a:p>
-            <a:endParaRPr lang="en-US" dirty="0"/>
-          </a:p>
-        </p:txBody>
-      </p:sp>
+      </p:pic>
       <p:graphicFrame>
         <p:nvGraphicFramePr>
           <p:cNvPr id="4" name="Diagram 3">
@@ -45305,7 +45308,7 @@
         </p:xfrm>
         <a:graphic>
           <a:graphicData uri="http://schemas.openxmlformats.org/drawingml/2006/diagram">
-            <dgm:relIds xmlns:dgm="http://schemas.openxmlformats.org/drawingml/2006/diagram" xmlns:r="http://schemas.openxmlformats.org/officeDocument/2006/relationships" r:dm="rId2" r:lo="rId3" r:qs="rId4" r:cs="rId5"/>
+            <dgm:relIds xmlns:dgm="http://schemas.openxmlformats.org/drawingml/2006/diagram" xmlns:r="http://schemas.openxmlformats.org/officeDocument/2006/relationships" r:dm="rId3" r:lo="rId4" r:qs="rId5" r:cs="rId6"/>
           </a:graphicData>
         </a:graphic>
       </p:graphicFrame>
@@ -45369,31 +45372,35 @@
           </a:p>
         </p:txBody>
       </p:sp>
-      <p:sp>
-        <p:nvSpPr>
-          <p:cNvPr id="3" name="Content Placeholder 2">
+      <p:pic>
+        <p:nvPicPr>
+          <p:cNvPr id="6" name="Content Placeholder 5" descr="A close up of a map&#10;&#10;Description automatically generated">
             <a:extLst>
               <a:ext uri="{FF2B5EF4-FFF2-40B4-BE49-F238E27FC236}">
-                <a16:creationId xmlns:a16="http://schemas.microsoft.com/office/drawing/2014/main" id="{175383A1-B82F-4069-AB75-4CFF92727E3F}"/>
+                <a16:creationId xmlns:a16="http://schemas.microsoft.com/office/drawing/2014/main" id="{5C6D6FD1-796C-4E28-91E0-5E4AED27F71A}"/>
               </a:ext>
             </a:extLst>
           </p:cNvPr>
-          <p:cNvSpPr>
-            <a:spLocks noGrp="1"/>
-          </p:cNvSpPr>
+          <p:cNvPicPr>
+            <a:picLocks noGrp="1" noChangeAspect="1"/>
+          </p:cNvPicPr>
           <p:nvPr>
             <p:ph idx="1"/>
           </p:nvPr>
-        </p:nvSpPr>
-        <p:spPr/>
-        <p:txBody>
-          <a:bodyPr/>
-          <a:lstStyle/>
-          <a:p>
-            <a:endParaRPr lang="en-US"/>
-          </a:p>
-        </p:txBody>
-      </p:sp>
+        </p:nvPicPr>
+        <p:blipFill>
+          <a:blip r:embed="rId2"/>
+          <a:stretch>
+            <a:fillRect/>
+          </a:stretch>
+        </p:blipFill>
+        <p:spPr>
+          <a:xfrm>
+            <a:off x="2773892" y="1846263"/>
+            <a:ext cx="6704542" cy="4022725"/>
+          </a:xfrm>
+        </p:spPr>
+      </p:pic>
       <p:graphicFrame>
         <p:nvGraphicFramePr>
           <p:cNvPr id="4" name="Diagram 3">
@@ -45418,7 +45425,7 @@
         </p:xfrm>
         <a:graphic>
           <a:graphicData uri="http://schemas.openxmlformats.org/drawingml/2006/diagram">
-            <dgm:relIds xmlns:dgm="http://schemas.openxmlformats.org/drawingml/2006/diagram" xmlns:r="http://schemas.openxmlformats.org/officeDocument/2006/relationships" r:dm="rId2" r:lo="rId3" r:qs="rId4" r:cs="rId5"/>
+            <dgm:relIds xmlns:dgm="http://schemas.openxmlformats.org/drawingml/2006/diagram" xmlns:r="http://schemas.openxmlformats.org/officeDocument/2006/relationships" r:dm="rId3" r:lo="rId4" r:qs="rId5" r:cs="rId6"/>
           </a:graphicData>
         </a:graphic>
       </p:graphicFrame>

</xml_diff>